<commit_message>
small update for lab #2
</commit_message>
<xml_diff>
--- a/classes/stats2016/Lab02.pptx
+++ b/classes/stats2016/Lab02.pptx
@@ -3505,7 +3505,7 @@
         <p:spPr>
           <a:xfrm>
             <a:off x="762000" y="533400"/>
-            <a:ext cx="7901009" cy="1754326"/>
+            <a:ext cx="7901009" cy="2308324"/>
           </a:xfrm>
           <a:prstGeom prst="rect">
             <a:avLst/>
@@ -3535,15 +3535,7 @@
           <a:p>
             <a:r>
               <a:rPr lang="en-US" dirty="0" smtClean="0"/>
-              <a:t>By the beginning of the next lab </a:t>
-            </a:r>
-            <a:r>
-              <a:rPr lang="en-US" dirty="0" smtClean="0"/>
-              <a:t>(Feb. 3), </a:t>
-            </a:r>
-            <a:r>
-              <a:rPr lang="en-US" dirty="0" smtClean="0"/>
-              <a:t>send what you have to </a:t>
+              <a:t>By the beginning of the next lab (Feb. 3), send what you have to </a:t>
             </a:r>
             <a:r>
               <a:rPr lang="en-US" dirty="0" smtClean="0">
@@ -3559,7 +3551,24 @@
           <a:p>
             <a:r>
               <a:rPr lang="en-US" dirty="0" smtClean="0"/>
-              <a:t>Send your code and the answers to questions..</a:t>
+              <a:t>Send your code and the answers to questions</a:t>
+            </a:r>
+            <a:r>
+              <a:rPr lang="en-US" dirty="0" smtClean="0"/>
+              <a:t>..</a:t>
+            </a:r>
+          </a:p>
+          <a:p>
+            <a:endParaRPr lang="en-US" dirty="0" smtClean="0"/>
+          </a:p>
+          <a:p>
+            <a:r>
+              <a:rPr lang="en-US" dirty="0" smtClean="0"/>
+              <a:t>Make sure the text “Lab #2” is in the </a:t>
+            </a:r>
+            <a:r>
+              <a:rPr lang="en-US" smtClean="0"/>
+              <a:t>subject line… </a:t>
             </a:r>
             <a:endParaRPr lang="en-US" dirty="0" smtClean="0"/>
           </a:p>
@@ -4032,25 +4041,13 @@
           <a:p>
             <a:r>
               <a:rPr lang="en-US" dirty="0" smtClean="0"/>
-              <a:t>	</a:t>
-            </a:r>
-            <a:r>
-              <a:rPr lang="en-US" dirty="0" smtClean="0"/>
-              <a:t>(2A) Plot out the probability density function with the x-axis the number of</a:t>
-            </a:r>
-          </a:p>
-          <a:p>
-            <a:r>
-              <a:rPr lang="en-US" dirty="0" smtClean="0"/>
-              <a:t>	</a:t>
-            </a:r>
-            <a:r>
-              <a:rPr lang="en-US" dirty="0" smtClean="0"/>
-              <a:t>patients that survive.</a:t>
-            </a:r>
-            <a:r>
-              <a:rPr lang="en-US" dirty="0" smtClean="0"/>
-              <a:t> </a:t>
+              <a:t>	(2A) Plot out the probability density function with the x-axis the number of</a:t>
+            </a:r>
+          </a:p>
+          <a:p>
+            <a:r>
+              <a:rPr lang="en-US" dirty="0" smtClean="0"/>
+              <a:t>	patients that survive. </a:t>
             </a:r>
           </a:p>
           <a:p>
@@ -4059,11 +4056,7 @@
           <a:p>
             <a:r>
               <a:rPr lang="en-US" dirty="0" smtClean="0"/>
-              <a:t>	(2B) </a:t>
-            </a:r>
-            <a:r>
-              <a:rPr lang="en-US" dirty="0" smtClean="0"/>
-              <a:t>What is the p-value for a null hypothesis that the drug has no effect.</a:t>
+              <a:t>	(2B) What is the p-value for a null hypothesis that the drug has no effect.</a:t>
             </a:r>
           </a:p>
           <a:p>
@@ -4078,15 +4071,7 @@
           <a:p>
             <a:r>
               <a:rPr lang="en-US" dirty="0" smtClean="0"/>
-              <a:t>	(</a:t>
-            </a:r>
-            <a:r>
-              <a:rPr lang="en-US" dirty="0" smtClean="0"/>
-              <a:t>2C) </a:t>
-            </a:r>
-            <a:r>
-              <a:rPr lang="en-US" dirty="0" smtClean="0"/>
-              <a:t>What is the p-value for a null hypothesis that the drug does not </a:t>
+              <a:t>	(2C) What is the p-value for a null hypothesis that the drug does not </a:t>
             </a:r>
           </a:p>
           <a:p>

</xml_diff>